<commit_message>
moving average on centerline tangent vector
</commit_message>
<xml_diff>
--- a/SetupAndUsage.pptx
+++ b/SetupAndUsage.pptx
@@ -16,7 +16,7 @@
     <p:sldId id="264" r:id="rId7"/>
     <p:sldId id="265" r:id="rId8"/>
     <p:sldId id="266" r:id="rId9"/>
-    <p:sldId id="259" r:id="rId10"/>
+    <p:sldId id="267" r:id="rId10"/>
     <p:sldId id="260" r:id="rId11"/>
   </p:sldIdLst>
   <p:sldSz cx="12192000" cy="6858000"/>
@@ -374,7 +374,7 @@
           <a:p>
             <a:fld id="{0A25DFDC-D383-477A-A3F4-5EC5443337A2}" type="datetimeFigureOut">
               <a:rPr kumimoji="1" lang="ja-JP" altLang="en-US" smtClean="0"/>
-              <a:t>2024/12/13</a:t>
+              <a:t>2025/1/20</a:t>
             </a:fld>
             <a:endParaRPr kumimoji="1" lang="ja-JP" altLang="en-US"/>
           </a:p>
@@ -820,7 +820,7 @@
           <a:p>
             <a:fld id="{8BA90221-D039-46F3-A118-908CAEDB2A53}" type="datetime1">
               <a:rPr kumimoji="1" lang="ja-JP" altLang="en-US" smtClean="0"/>
-              <a:t>2024/12/13</a:t>
+              <a:t>2025/1/20</a:t>
             </a:fld>
             <a:endParaRPr kumimoji="1" lang="ja-JP" altLang="en-US"/>
           </a:p>
@@ -1050,7 +1050,7 @@
           <a:p>
             <a:fld id="{EB894DB9-6082-4A91-8B72-232E30FB879B}" type="datetime1">
               <a:rPr kumimoji="1" lang="ja-JP" altLang="en-US" smtClean="0"/>
-              <a:t>2024/12/13</a:t>
+              <a:t>2025/1/20</a:t>
             </a:fld>
             <a:endParaRPr kumimoji="1" lang="ja-JP" altLang="en-US"/>
           </a:p>
@@ -1290,7 +1290,7 @@
           <a:p>
             <a:fld id="{A988BB68-1B52-45AD-9EA0-591C0B71EF8C}" type="datetime1">
               <a:rPr kumimoji="1" lang="ja-JP" altLang="en-US" smtClean="0"/>
-              <a:t>2024/12/13</a:t>
+              <a:t>2025/1/20</a:t>
             </a:fld>
             <a:endParaRPr kumimoji="1" lang="ja-JP" altLang="en-US"/>
           </a:p>
@@ -1525,7 +1525,7 @@
           <a:p>
             <a:fld id="{264A83B4-51C5-429F-97AA-BD916A4E8DDA}" type="datetime1">
               <a:rPr kumimoji="1" lang="ja-JP" altLang="en-US" smtClean="0"/>
-              <a:t>2024/12/13</a:t>
+              <a:t>2025/1/20</a:t>
             </a:fld>
             <a:endParaRPr kumimoji="1" lang="ja-JP" altLang="en-US"/>
           </a:p>
@@ -1800,7 +1800,7 @@
           <a:p>
             <a:fld id="{5EA5DBBD-4273-4696-AEFD-847B57A973C0}" type="datetime1">
               <a:rPr kumimoji="1" lang="ja-JP" altLang="en-US" smtClean="0"/>
-              <a:t>2024/12/13</a:t>
+              <a:t>2025/1/20</a:t>
             </a:fld>
             <a:endParaRPr kumimoji="1" lang="ja-JP" altLang="en-US"/>
           </a:p>
@@ -2129,7 +2129,7 @@
           <a:p>
             <a:fld id="{06C5B88E-97A2-415A-AEFC-6E59C4521713}" type="datetime1">
               <a:rPr kumimoji="1" lang="ja-JP" altLang="en-US" smtClean="0"/>
-              <a:t>2024/12/13</a:t>
+              <a:t>2025/1/20</a:t>
             </a:fld>
             <a:endParaRPr kumimoji="1" lang="ja-JP" altLang="en-US"/>
           </a:p>
@@ -2605,7 +2605,7 @@
           <a:p>
             <a:fld id="{CC14BE53-2557-4928-9C75-D32E8CB152B2}" type="datetime1">
               <a:rPr kumimoji="1" lang="ja-JP" altLang="en-US" smtClean="0"/>
-              <a:t>2024/12/13</a:t>
+              <a:t>2025/1/20</a:t>
             </a:fld>
             <a:endParaRPr kumimoji="1" lang="ja-JP" altLang="en-US"/>
           </a:p>
@@ -2746,7 +2746,7 @@
           <a:p>
             <a:fld id="{64FD717B-6543-4440-9FFA-F5B564E6440D}" type="datetime1">
               <a:rPr kumimoji="1" lang="ja-JP" altLang="en-US" smtClean="0"/>
-              <a:t>2024/12/13</a:t>
+              <a:t>2025/1/20</a:t>
             </a:fld>
             <a:endParaRPr kumimoji="1" lang="ja-JP" altLang="en-US"/>
           </a:p>
@@ -2859,7 +2859,7 @@
           <a:p>
             <a:fld id="{7B158665-4FF8-4774-B341-032A076E3B51}" type="datetime1">
               <a:rPr kumimoji="1" lang="ja-JP" altLang="en-US" smtClean="0"/>
-              <a:t>2024/12/13</a:t>
+              <a:t>2025/1/20</a:t>
             </a:fld>
             <a:endParaRPr kumimoji="1" lang="ja-JP" altLang="en-US"/>
           </a:p>
@@ -3202,7 +3202,7 @@
           <a:p>
             <a:fld id="{976934DC-4F6F-4201-B830-C63D1F0C42BE}" type="datetime1">
               <a:rPr kumimoji="1" lang="ja-JP" altLang="en-US" smtClean="0"/>
-              <a:t>2024/12/13</a:t>
+              <a:t>2025/1/20</a:t>
             </a:fld>
             <a:endParaRPr kumimoji="1" lang="ja-JP" altLang="en-US"/>
           </a:p>
@@ -3490,7 +3490,7 @@
           <a:p>
             <a:fld id="{64EE5B98-0692-48E1-9545-557E26D34579}" type="datetime1">
               <a:rPr kumimoji="1" lang="ja-JP" altLang="en-US" smtClean="0"/>
-              <a:t>2024/12/13</a:t>
+              <a:t>2025/1/20</a:t>
             </a:fld>
             <a:endParaRPr kumimoji="1" lang="ja-JP" altLang="en-US"/>
           </a:p>
@@ -3762,7 +3762,7 @@
             <a:fld id="{03FF5FD0-B0CD-405C-A09F-FA342F314525}" type="datetime1">
               <a:rPr lang="ja-JP" altLang="en-US" smtClean="0"/>
               <a:pPr/>
-              <a:t>2024/12/13</a:t>
+              <a:t>2025/1/20</a:t>
             </a:fld>
             <a:endParaRPr lang="ja-JP" altLang="en-US" dirty="0"/>
           </a:p>
@@ -4197,7 +4197,7 @@
         </p:nvSpPr>
         <p:spPr>
           <a:xfrm>
-            <a:off x="2099187" y="2503573"/>
+            <a:off x="838200" y="817395"/>
             <a:ext cx="10515600" cy="1325563"/>
           </a:xfrm>
         </p:spPr>
@@ -4239,7 +4239,7 @@
           <a:p>
             <a:fld id="{264A83B4-51C5-429F-97AA-BD916A4E8DDA}" type="datetime1">
               <a:rPr kumimoji="1" lang="ja-JP" altLang="en-US" smtClean="0"/>
-              <a:t>2024/12/13</a:t>
+              <a:t>2025/1/20</a:t>
             </a:fld>
             <a:endParaRPr kumimoji="1" lang="ja-JP" altLang="en-US"/>
           </a:p>
@@ -4274,6 +4274,42 @@
           </a:p>
         </p:txBody>
       </p:sp>
+      <p:pic>
+        <p:nvPicPr>
+          <p:cNvPr id="7" name="図 6" descr="グラフィカル ユーザー インターフェイス, テキスト, アプリケーション&#10;&#10;自動的に生成された説明">
+            <a:extLst>
+              <a:ext uri="{FF2B5EF4-FFF2-40B4-BE49-F238E27FC236}">
+                <a16:creationId xmlns:a16="http://schemas.microsoft.com/office/drawing/2014/main" id="{37DA8012-D3D1-67A7-7572-81F444FD6E64}"/>
+              </a:ext>
+            </a:extLst>
+          </p:cNvPr>
+          <p:cNvPicPr>
+            <a:picLocks noChangeAspect="1"/>
+          </p:cNvPicPr>
+          <p:nvPr/>
+        </p:nvPicPr>
+        <p:blipFill>
+          <a:blip r:embed="rId2">
+            <a:extLst>
+              <a:ext uri="{28A0092B-C50C-407E-A947-70E740481C1C}">
+                <a14:useLocalDpi xmlns:a14="http://schemas.microsoft.com/office/drawing/2010/main" val="0"/>
+              </a:ext>
+            </a:extLst>
+          </a:blip>
+          <a:stretch>
+            <a:fillRect/>
+          </a:stretch>
+        </p:blipFill>
+        <p:spPr>
+          <a:xfrm>
+            <a:off x="3000510" y="2978895"/>
+            <a:ext cx="5639289" cy="3254022"/>
+          </a:xfrm>
+          <a:prstGeom prst="rect">
+            <a:avLst/>
+          </a:prstGeom>
+        </p:spPr>
+      </p:pic>
     </p:spTree>
     <p:extLst>
       <p:ext uri="{BB962C8B-B14F-4D97-AF65-F5344CB8AC3E}">
@@ -5733,7 +5769,7 @@
           <a:p>
             <a:fld id="{3F1305B7-C1F6-4AA9-9F69-50D06E3DB05F}" type="datetime1">
               <a:rPr kumimoji="1" lang="ja-JP" altLang="en-US" smtClean="0"/>
-              <a:t>2024/12/13</a:t>
+              <a:t>2025/1/20</a:t>
             </a:fld>
             <a:endParaRPr kumimoji="1" lang="ja-JP" altLang="en-US"/>
           </a:p>
@@ -5925,8 +5961,30 @@
             </a:r>
             <a:r>
               <a:rPr kumimoji="1" lang="ja-JP" altLang="en-US" dirty="0"/>
-              <a:t>は、チューブ形状の流体解析モデルを変形するために開発したソフトウェアです。</a:t>
-            </a:r>
+              <a:t>は、チューブ形状の流体解析モデル</a:t>
+            </a:r>
+            <a:r>
+              <a:rPr kumimoji="1" lang="en-US" altLang="ja-JP" dirty="0"/>
+              <a:t>(</a:t>
+            </a:r>
+            <a:r>
+              <a:rPr kumimoji="1" lang="ja-JP" altLang="en-US" dirty="0"/>
+              <a:t>テトラ・プリズム複合メッシュ</a:t>
+            </a:r>
+            <a:r>
+              <a:rPr kumimoji="1" lang="en-US" altLang="ja-JP" dirty="0"/>
+              <a:t>)</a:t>
+            </a:r>
+            <a:r>
+              <a:rPr kumimoji="1" lang="ja-JP" altLang="en-US" dirty="0"/>
+              <a:t>を変形するために開発したソフトウェアです。</a:t>
+            </a:r>
+            <a:endParaRPr kumimoji="1" lang="en-US" altLang="ja-JP" dirty="0"/>
+          </a:p>
+          <a:p>
+            <a:pPr marL="0" indent="0">
+              <a:buNone/>
+            </a:pPr>
             <a:endParaRPr kumimoji="1" lang="en-US" altLang="ja-JP" dirty="0"/>
           </a:p>
           <a:p>
@@ -5951,9 +6009,12 @@
             </a:r>
             <a:r>
               <a:rPr kumimoji="1" lang="ja-JP" altLang="en-US" dirty="0"/>
-              <a:t>を入力として使います。</a:t>
-            </a:r>
-            <a:endParaRPr kumimoji="1" lang="en-US" altLang="ja-JP" dirty="0"/>
+              <a:t> </a:t>
+            </a:r>
+            <a:r>
+              <a:rPr kumimoji="1" lang="en-US" altLang="ja-JP" dirty="0"/>
+              <a:t>, </a:t>
+            </a:r>
           </a:p>
           <a:p>
             <a:pPr marL="0" indent="0">
@@ -5961,7 +6022,7 @@
             </a:pPr>
             <a:r>
               <a:rPr lang="ja-JP" altLang="en-US" dirty="0"/>
-              <a:t>　また、変形のための目標中心線点群</a:t>
+              <a:t>　変形のための目標中心線点群</a:t>
             </a:r>
             <a:r>
               <a:rPr lang="en-US" altLang="ja-JP" dirty="0"/>
@@ -5969,7 +6030,41 @@
             </a:r>
             <a:r>
               <a:rPr lang="ja-JP" altLang="en-US" dirty="0"/>
-              <a:t>も入力として使います。</a:t>
+              <a:t>の</a:t>
+            </a:r>
+            <a:r>
+              <a:rPr lang="en-US" altLang="ja-JP" dirty="0"/>
+              <a:t>3</a:t>
+            </a:r>
+            <a:r>
+              <a:rPr lang="ja-JP" altLang="en-US" dirty="0"/>
+              <a:t>つを入力として使います。</a:t>
+            </a:r>
+            <a:endParaRPr lang="en-US" altLang="ja-JP" dirty="0"/>
+          </a:p>
+          <a:p>
+            <a:pPr marL="0" indent="0">
+              <a:buNone/>
+            </a:pPr>
+            <a:endParaRPr lang="en-US" altLang="ja-JP" dirty="0"/>
+          </a:p>
+          <a:p>
+            <a:pPr marL="0" indent="0">
+              <a:buNone/>
+            </a:pPr>
+            <a:r>
+              <a:rPr lang="ja-JP" altLang="en-US" dirty="0"/>
+              <a:t>・変形前後の中心線から移動量・変形量を計算し、それに従って</a:t>
+            </a:r>
+            <a:endParaRPr lang="en-US" altLang="ja-JP" dirty="0"/>
+          </a:p>
+          <a:p>
+            <a:pPr marL="0" indent="0">
+              <a:buNone/>
+            </a:pPr>
+            <a:r>
+              <a:rPr lang="ja-JP" altLang="en-US" dirty="0"/>
+              <a:t>　メッシュ全体を移動・変形させ、新たな解析モデルを得ることができます。</a:t>
             </a:r>
             <a:endParaRPr lang="en-US" altLang="ja-JP" dirty="0"/>
           </a:p>
@@ -5998,7 +6093,7 @@
           <a:p>
             <a:fld id="{264A83B4-51C5-429F-97AA-BD916A4E8DDA}" type="datetime1">
               <a:rPr kumimoji="1" lang="ja-JP" altLang="en-US" smtClean="0"/>
-              <a:t>2024/12/13</a:t>
+              <a:t>2025/1/20</a:t>
             </a:fld>
             <a:endParaRPr kumimoji="1" lang="ja-JP" altLang="en-US"/>
           </a:p>
@@ -6109,12 +6204,14 @@
         </p:nvSpPr>
         <p:spPr>
           <a:xfrm>
-            <a:off x="0" y="877490"/>
+            <a:off x="71582" y="877490"/>
             <a:ext cx="11905673" cy="5103019"/>
           </a:xfrm>
         </p:spPr>
         <p:txBody>
-          <a:bodyPr/>
+          <a:bodyPr>
+            <a:normAutofit fontScale="92500" lnSpcReduction="20000"/>
+          </a:bodyPr>
           <a:lstStyle/>
           <a:p>
             <a:r>
@@ -6141,16 +6238,11 @@
           <a:p>
             <a:r>
               <a:rPr kumimoji="1" lang="en-US" altLang="ja-JP" dirty="0"/>
-              <a:t>Python3.11 </a:t>
-            </a:r>
-          </a:p>
-          <a:p>
-            <a:pPr marL="0" indent="0">
-              <a:buNone/>
-            </a:pPr>
+              <a:t>Python3.11    </a:t>
+            </a:r>
             <a:r>
               <a:rPr lang="ja-JP" altLang="en-US" dirty="0"/>
-              <a:t>　インストールしてパスを通してください</a:t>
+              <a:t>インストールしてパスを通してください</a:t>
             </a:r>
             <a:endParaRPr lang="en-US" altLang="ja-JP" dirty="0"/>
           </a:p>
@@ -6234,6 +6326,85 @@
             </a:r>
             <a:endParaRPr lang="en-US" altLang="ja-JP" dirty="0"/>
           </a:p>
+          <a:p>
+            <a:pPr marL="0" indent="0">
+              <a:buNone/>
+            </a:pPr>
+            <a:endParaRPr lang="en-US" altLang="ja-JP" dirty="0"/>
+          </a:p>
+          <a:p>
+            <a:r>
+              <a:rPr kumimoji="1" lang="en-US" altLang="ja-JP" dirty="0"/>
+              <a:t>LocalPath.txt</a:t>
+            </a:r>
+            <a:r>
+              <a:rPr lang="ja-JP" altLang="en-US" dirty="0"/>
+              <a:t> のパスを適切に書き直して下さい。</a:t>
+            </a:r>
+            <a:endParaRPr lang="en-US" altLang="ja-JP" dirty="0"/>
+          </a:p>
+          <a:p>
+            <a:pPr marL="0" indent="0">
+              <a:buNone/>
+            </a:pPr>
+            <a:r>
+              <a:rPr lang="ja-JP" altLang="en-US" dirty="0"/>
+              <a:t>　</a:t>
+            </a:r>
+            <a:r>
+              <a:rPr lang="en-US" altLang="ja-JP" dirty="0"/>
+              <a:t>1</a:t>
+            </a:r>
+            <a:r>
+              <a:rPr lang="ja-JP" altLang="en-US" dirty="0"/>
+              <a:t>行目 </a:t>
+            </a:r>
+            <a:r>
+              <a:rPr lang="en-US" altLang="ja-JP" dirty="0"/>
+              <a:t>: python3.11</a:t>
+            </a:r>
+            <a:r>
+              <a:rPr lang="ja-JP" altLang="en-US" dirty="0"/>
+              <a:t>のパス</a:t>
+            </a:r>
+            <a:endParaRPr lang="en-US" altLang="ja-JP" dirty="0"/>
+          </a:p>
+          <a:p>
+            <a:pPr marL="0" indent="0">
+              <a:buNone/>
+            </a:pPr>
+            <a:r>
+              <a:rPr kumimoji="1" lang="ja-JP" altLang="en-US" dirty="0"/>
+              <a:t>　</a:t>
+            </a:r>
+            <a:r>
+              <a:rPr kumimoji="1" lang="en-US" altLang="ja-JP" dirty="0"/>
+              <a:t>2</a:t>
+            </a:r>
+            <a:r>
+              <a:rPr kumimoji="1" lang="ja-JP" altLang="en-US" dirty="0"/>
+              <a:t>行目 </a:t>
+            </a:r>
+            <a:r>
+              <a:rPr kumimoji="1" lang="en-US" altLang="ja-JP" dirty="0"/>
+              <a:t>:</a:t>
+            </a:r>
+            <a:r>
+              <a:rPr lang="ja-JP" altLang="en-US" sz="2800" dirty="0">
+                <a:latin typeface="+mn-ea"/>
+              </a:rPr>
+              <a:t>テトラメッシュを切りなおすスクリプト のパス</a:t>
+            </a:r>
+            <a:endParaRPr lang="en-US" altLang="ja-JP" sz="2800" dirty="0">
+              <a:latin typeface="+mn-ea"/>
+            </a:endParaRPr>
+          </a:p>
+          <a:p>
+            <a:pPr marL="0" indent="0">
+              <a:buNone/>
+            </a:pPr>
+            <a:endParaRPr lang="en-US" altLang="ja-JP" dirty="0"/>
+          </a:p>
         </p:txBody>
       </p:sp>
       <p:sp>
@@ -6259,7 +6430,7 @@
           <a:p>
             <a:fld id="{264A83B4-51C5-429F-97AA-BD916A4E8DDA}" type="datetime1">
               <a:rPr kumimoji="1" lang="ja-JP" altLang="en-US" smtClean="0"/>
-              <a:t>2024/12/13</a:t>
+              <a:t>2025/1/20</a:t>
             </a:fld>
             <a:endParaRPr kumimoji="1" lang="ja-JP" altLang="en-US"/>
           </a:p>
@@ -6294,6 +6465,42 @@
           </a:p>
         </p:txBody>
       </p:sp>
+      <p:pic>
+        <p:nvPicPr>
+          <p:cNvPr id="7" name="図 6" descr="テキスト&#10;&#10;自動的に生成された説明">
+            <a:extLst>
+              <a:ext uri="{FF2B5EF4-FFF2-40B4-BE49-F238E27FC236}">
+                <a16:creationId xmlns:a16="http://schemas.microsoft.com/office/drawing/2014/main" id="{AED66DE8-9F41-D59D-4904-3897E8D2C548}"/>
+              </a:ext>
+            </a:extLst>
+          </p:cNvPr>
+          <p:cNvPicPr>
+            <a:picLocks noChangeAspect="1"/>
+          </p:cNvPicPr>
+          <p:nvPr/>
+        </p:nvPicPr>
+        <p:blipFill>
+          <a:blip r:embed="rId3">
+            <a:extLst>
+              <a:ext uri="{28A0092B-C50C-407E-A947-70E740481C1C}">
+                <a14:useLocalDpi xmlns:a14="http://schemas.microsoft.com/office/drawing/2010/main" val="0"/>
+              </a:ext>
+            </a:extLst>
+          </a:blip>
+          <a:stretch>
+            <a:fillRect/>
+          </a:stretch>
+        </p:blipFill>
+        <p:spPr>
+          <a:xfrm>
+            <a:off x="7149504" y="4784489"/>
+            <a:ext cx="4970914" cy="869298"/>
+          </a:xfrm>
+          <a:prstGeom prst="rect">
+            <a:avLst/>
+          </a:prstGeom>
+        </p:spPr>
+      </p:pic>
     </p:spTree>
     <p:extLst>
       <p:ext uri="{BB962C8B-B14F-4D97-AF65-F5344CB8AC3E}">
@@ -6347,7 +6554,7 @@
           <a:p>
             <a:r>
               <a:rPr kumimoji="1" lang="ja-JP" altLang="en-US" dirty="0"/>
-              <a:t>環境構築</a:t>
+              <a:t>操作手順</a:t>
             </a:r>
           </a:p>
         </p:txBody>
@@ -6368,82 +6575,248 @@
             <p:ph idx="1"/>
           </p:nvPr>
         </p:nvSpPr>
-        <p:spPr/>
-        <p:txBody>
-          <a:bodyPr/>
-          <a:lstStyle/>
-          <a:p>
-            <a:r>
-              <a:rPr kumimoji="1" lang="en-US" altLang="ja-JP" dirty="0"/>
-              <a:t>LocalPath.txt</a:t>
-            </a:r>
-            <a:r>
-              <a:rPr lang="ja-JP" altLang="en-US" dirty="0"/>
-              <a:t> のパスを適切に書き直して</a:t>
-            </a:r>
-            <a:endParaRPr lang="en-US" altLang="ja-JP" dirty="0"/>
-          </a:p>
+        <p:spPr>
+          <a:xfrm>
+            <a:off x="79913" y="1034806"/>
+            <a:ext cx="11905673" cy="5103019"/>
+          </a:xfrm>
+        </p:spPr>
+        <p:txBody>
+          <a:bodyPr>
+            <a:normAutofit/>
+          </a:bodyPr>
+          <a:lstStyle/>
           <a:p>
             <a:pPr marL="0" indent="0">
               <a:buNone/>
             </a:pPr>
-            <a:r>
-              <a:rPr lang="ja-JP" altLang="en-US" dirty="0"/>
-              <a:t>　下さい。</a:t>
-            </a:r>
-            <a:endParaRPr lang="en-US" altLang="ja-JP" dirty="0"/>
+            <a:endParaRPr lang="en-US" altLang="ja-JP" dirty="0">
+              <a:latin typeface="+mn-ea"/>
+            </a:endParaRPr>
           </a:p>
           <a:p>
             <a:pPr marL="0" indent="0">
               <a:buNone/>
             </a:pPr>
-            <a:r>
-              <a:rPr lang="ja-JP" altLang="en-US" dirty="0"/>
-              <a:t>　</a:t>
-            </a:r>
-            <a:r>
-              <a:rPr lang="en-US" altLang="ja-JP" dirty="0"/>
-              <a:t>1</a:t>
-            </a:r>
-            <a:r>
-              <a:rPr lang="ja-JP" altLang="en-US" dirty="0"/>
-              <a:t>行目 </a:t>
-            </a:r>
-            <a:r>
-              <a:rPr lang="en-US" altLang="ja-JP" dirty="0"/>
-              <a:t>: python3.11</a:t>
-            </a:r>
-            <a:r>
-              <a:rPr lang="ja-JP" altLang="en-US" dirty="0"/>
-              <a:t>のパス</a:t>
-            </a:r>
-            <a:endParaRPr lang="en-US" altLang="ja-JP" dirty="0"/>
-          </a:p>
-          <a:p>
-            <a:pPr marL="0" indent="0">
-              <a:buNone/>
-            </a:pPr>
-            <a:r>
-              <a:rPr kumimoji="1" lang="ja-JP" altLang="en-US" dirty="0"/>
-              <a:t>　</a:t>
-            </a:r>
-            <a:r>
-              <a:rPr kumimoji="1" lang="en-US" altLang="ja-JP" dirty="0"/>
-              <a:t>2</a:t>
-            </a:r>
-            <a:r>
-              <a:rPr kumimoji="1" lang="ja-JP" altLang="en-US" dirty="0"/>
-              <a:t>行目 </a:t>
-            </a:r>
-            <a:r>
-              <a:rPr kumimoji="1" lang="en-US" altLang="ja-JP" dirty="0"/>
-              <a:t>:</a:t>
-            </a:r>
             <a:r>
               <a:rPr lang="ja-JP" altLang="en-US" sz="2800" dirty="0">
                 <a:latin typeface="+mn-ea"/>
               </a:rPr>
-              <a:t>テトラメッシュを切りなおすスクリプト のパス</a:t>
+              <a:t>・まず適当にフォルダを作成し、「</a:t>
+            </a:r>
+            <a:r>
+              <a:rPr lang="en-US" altLang="ja-JP" sz="2800" dirty="0">
+                <a:latin typeface="+mn-ea"/>
+              </a:rPr>
+              <a:t>makemesh.py</a:t>
+            </a:r>
+            <a:r>
+              <a:rPr lang="ja-JP" altLang="en-US" sz="2800" dirty="0">
+                <a:latin typeface="+mn-ea"/>
+              </a:rPr>
+              <a:t>」と、</a:t>
+            </a:r>
+            <a:endParaRPr lang="en-US" altLang="ja-JP" sz="2800" dirty="0">
+              <a:latin typeface="+mn-ea"/>
+            </a:endParaRPr>
+          </a:p>
+          <a:p>
+            <a:pPr marL="0" indent="0">
+              <a:buNone/>
+            </a:pPr>
+            <a:r>
+              <a:rPr lang="ja-JP" altLang="en-US" dirty="0">
+                <a:latin typeface="+mn-ea"/>
+              </a:rPr>
+              <a:t>　</a:t>
+            </a:r>
+            <a:r>
+              <a:rPr lang="ja-JP" altLang="en-US" sz="2800" dirty="0">
+                <a:latin typeface="+mn-ea"/>
+              </a:rPr>
+              <a:t>入力データとなる「</a:t>
+            </a:r>
+            <a:r>
+              <a:rPr lang="en-US" altLang="ja-JP" sz="2800" dirty="0">
+                <a:latin typeface="+mn-ea"/>
+              </a:rPr>
+              <a:t>WALL.stl</a:t>
+            </a:r>
+            <a:r>
+              <a:rPr lang="ja-JP" altLang="en-US" sz="2800" dirty="0">
+                <a:latin typeface="+mn-ea"/>
+              </a:rPr>
+              <a:t>」</a:t>
+            </a:r>
+            <a:r>
+              <a:rPr lang="en-US" altLang="ja-JP" sz="2800" dirty="0">
+                <a:latin typeface="+mn-ea"/>
+              </a:rPr>
+              <a:t>, </a:t>
+            </a:r>
+            <a:r>
+              <a:rPr lang="ja-JP" altLang="en-US" sz="2800" dirty="0">
+                <a:latin typeface="+mn-ea"/>
+              </a:rPr>
+              <a:t>「</a:t>
+            </a:r>
+            <a:r>
+              <a:rPr lang="en-US" altLang="ja-JP" sz="2800" dirty="0">
+                <a:latin typeface="+mn-ea"/>
+              </a:rPr>
+              <a:t>centerline.txt</a:t>
+            </a:r>
+            <a:r>
+              <a:rPr lang="ja-JP" altLang="en-US" sz="2800" dirty="0">
+                <a:latin typeface="+mn-ea"/>
+              </a:rPr>
+              <a:t>」</a:t>
+            </a:r>
+            <a:r>
+              <a:rPr lang="en-US" altLang="ja-JP" sz="2800" dirty="0">
+                <a:latin typeface="+mn-ea"/>
+              </a:rPr>
+              <a:t>,</a:t>
+            </a:r>
+            <a:r>
+              <a:rPr lang="ja-JP" altLang="en-US" dirty="0">
+                <a:latin typeface="+mn-ea"/>
+              </a:rPr>
+              <a:t>「</a:t>
+            </a:r>
+            <a:r>
+              <a:rPr lang="en-US" altLang="ja-JP" dirty="0">
+                <a:latin typeface="+mn-ea"/>
+              </a:rPr>
+              <a:t>centerlineFinal.txt</a:t>
+            </a:r>
+            <a:r>
+              <a:rPr lang="ja-JP" altLang="en-US" dirty="0">
+                <a:latin typeface="+mn-ea"/>
+              </a:rPr>
+              <a:t>」</a:t>
+            </a:r>
+            <a:endParaRPr lang="en-US" altLang="ja-JP" dirty="0">
+              <a:latin typeface="+mn-ea"/>
+            </a:endParaRPr>
+          </a:p>
+          <a:p>
+            <a:pPr marL="0" indent="0">
+              <a:buNone/>
+            </a:pPr>
+            <a:r>
+              <a:rPr lang="ja-JP" altLang="en-US" dirty="0">
+                <a:latin typeface="+mn-ea"/>
+              </a:rPr>
+              <a:t>　の</a:t>
+            </a:r>
+            <a:r>
+              <a:rPr lang="en-US" altLang="ja-JP" dirty="0">
+                <a:latin typeface="+mn-ea"/>
+              </a:rPr>
+              <a:t>4</a:t>
+            </a:r>
+            <a:r>
+              <a:rPr lang="ja-JP" altLang="en-US" dirty="0">
+                <a:latin typeface="+mn-ea"/>
+              </a:rPr>
+              <a:t>つのファイルを入れてください</a:t>
+            </a:r>
+            <a:r>
+              <a:rPr lang="en-US" altLang="ja-JP" dirty="0">
+                <a:latin typeface="+mn-ea"/>
+              </a:rPr>
+              <a:t>(WALL.stl</a:t>
+            </a:r>
+            <a:r>
+              <a:rPr lang="ja-JP" altLang="en-US" dirty="0">
+                <a:latin typeface="+mn-ea"/>
+              </a:rPr>
+              <a:t>はこの名前である必要があります</a:t>
+            </a:r>
+            <a:r>
+              <a:rPr lang="en-US" altLang="ja-JP" dirty="0">
+                <a:latin typeface="+mn-ea"/>
+              </a:rPr>
+              <a:t>)</a:t>
+            </a:r>
+            <a:r>
+              <a:rPr lang="ja-JP" altLang="en-US" dirty="0">
+                <a:latin typeface="+mn-ea"/>
+              </a:rPr>
+              <a:t>。</a:t>
+            </a:r>
+            <a:endParaRPr lang="en-US" altLang="ja-JP" dirty="0">
+              <a:latin typeface="+mn-ea"/>
+            </a:endParaRPr>
+          </a:p>
+          <a:p>
+            <a:pPr marL="0" indent="0">
+              <a:buNone/>
+            </a:pPr>
+            <a:endParaRPr lang="en-US" altLang="ja-JP" dirty="0">
+              <a:latin typeface="+mn-ea"/>
+            </a:endParaRPr>
+          </a:p>
+          <a:p>
+            <a:pPr marL="0" indent="0">
+              <a:buNone/>
+            </a:pPr>
+            <a:r>
+              <a:rPr lang="ja-JP" altLang="en-US" dirty="0">
+                <a:latin typeface="+mn-ea"/>
+              </a:rPr>
+              <a:t>・</a:t>
+            </a:r>
+            <a:r>
+              <a:rPr lang="en-US" altLang="ja-JP" dirty="0">
+                <a:latin typeface="+mn-ea"/>
+              </a:rPr>
+              <a:t>makemesh.py</a:t>
+            </a:r>
+            <a:r>
+              <a:rPr lang="ja-JP" altLang="en-US" dirty="0">
+                <a:latin typeface="+mn-ea"/>
+              </a:rPr>
+              <a:t>内のパラメータ</a:t>
+            </a:r>
+            <a:r>
+              <a:rPr lang="en-US" altLang="ja-JP" dirty="0">
+                <a:latin typeface="+mn-ea"/>
+              </a:rPr>
+              <a:t>(</a:t>
+            </a:r>
+            <a:r>
+              <a:rPr lang="ja-JP" altLang="en-US" dirty="0">
+                <a:latin typeface="+mn-ea"/>
+              </a:rPr>
+              <a:t>メッシュサイズや、プリズム層の層数など</a:t>
+            </a:r>
+            <a:r>
+              <a:rPr lang="en-US" altLang="ja-JP" dirty="0">
+                <a:latin typeface="+mn-ea"/>
+              </a:rPr>
+              <a:t>)</a:t>
+            </a:r>
+            <a:r>
+              <a:rPr lang="ja-JP" altLang="en-US" dirty="0">
+                <a:latin typeface="+mn-ea"/>
+              </a:rPr>
+              <a:t>を</a:t>
+            </a:r>
+            <a:endParaRPr lang="en-US" altLang="ja-JP" dirty="0">
+              <a:latin typeface="+mn-ea"/>
+            </a:endParaRPr>
+          </a:p>
+          <a:p>
+            <a:pPr marL="0" indent="0">
+              <a:buNone/>
+            </a:pPr>
+            <a:r>
+              <a:rPr lang="ja-JP" altLang="en-US" dirty="0">
+                <a:latin typeface="+mn-ea"/>
+              </a:rPr>
+              <a:t>　必要に応じて変更してください</a:t>
             </a:r>
             <a:endParaRPr lang="en-US" altLang="ja-JP" sz="2800" dirty="0">
               <a:latin typeface="+mn-ea"/>
@@ -6461,56 +6834,6 @@
             <a:pPr marL="0" indent="0">
               <a:buNone/>
             </a:pPr>
-            <a:r>
-              <a:rPr lang="ja-JP" altLang="en-US" dirty="0">
-                <a:latin typeface="+mn-ea"/>
-              </a:rPr>
-              <a:t>・</a:t>
-            </a:r>
-            <a:r>
-              <a:rPr lang="en-US" altLang="ja-JP" dirty="0">
-                <a:latin typeface="+mn-ea"/>
-              </a:rPr>
-              <a:t>Form1.cs </a:t>
-            </a:r>
-            <a:r>
-              <a:rPr lang="ja-JP" altLang="en-US" dirty="0">
-                <a:latin typeface="+mn-ea"/>
-              </a:rPr>
-              <a:t>に、</a:t>
-            </a:r>
-            <a:r>
-              <a:rPr lang="en-US" altLang="ja-JP" dirty="0">
-                <a:latin typeface="+mn-ea"/>
-              </a:rPr>
-              <a:t>makemesh.py</a:t>
-            </a:r>
-            <a:r>
-              <a:rPr lang="ja-JP" altLang="en-US" dirty="0">
-                <a:latin typeface="+mn-ea"/>
-              </a:rPr>
-              <a:t>を参照するフィールドがあるので、</a:t>
-            </a:r>
-            <a:endParaRPr lang="en-US" altLang="ja-JP" dirty="0">
-              <a:latin typeface="+mn-ea"/>
-            </a:endParaRPr>
-          </a:p>
-          <a:p>
-            <a:pPr marL="0" indent="0">
-              <a:buNone/>
-            </a:pPr>
-            <a:r>
-              <a:rPr lang="ja-JP" altLang="en-US" dirty="0">
-                <a:latin typeface="+mn-ea"/>
-              </a:rPr>
-              <a:t>　パスを変更してください</a:t>
-            </a:r>
-            <a:endParaRPr kumimoji="1" lang="en-US" altLang="ja-JP" dirty="0"/>
-          </a:p>
-          <a:p>
-            <a:pPr marL="0" indent="0">
-              <a:buNone/>
-            </a:pPr>
             <a:endParaRPr lang="en-US" altLang="ja-JP" dirty="0"/>
           </a:p>
         </p:txBody>
@@ -6538,7 +6861,7 @@
           <a:p>
             <a:fld id="{264A83B4-51C5-429F-97AA-BD916A4E8DDA}" type="datetime1">
               <a:rPr kumimoji="1" lang="ja-JP" altLang="en-US" smtClean="0"/>
-              <a:t>2024/12/13</a:t>
+              <a:t>2025/1/20</a:t>
             </a:fld>
             <a:endParaRPr kumimoji="1" lang="ja-JP" altLang="en-US"/>
           </a:p>
@@ -6573,42 +6896,6 @@
           </a:p>
         </p:txBody>
       </p:sp>
-      <p:pic>
-        <p:nvPicPr>
-          <p:cNvPr id="7" name="図 6" descr="テキスト&#10;&#10;自動的に生成された説明">
-            <a:extLst>
-              <a:ext uri="{FF2B5EF4-FFF2-40B4-BE49-F238E27FC236}">
-                <a16:creationId xmlns:a16="http://schemas.microsoft.com/office/drawing/2014/main" id="{AED66DE8-9F41-D59D-4904-3897E8D2C548}"/>
-              </a:ext>
-            </a:extLst>
-          </p:cNvPr>
-          <p:cNvPicPr>
-            <a:picLocks noChangeAspect="1"/>
-          </p:cNvPicPr>
-          <p:nvPr/>
-        </p:nvPicPr>
-        <p:blipFill>
-          <a:blip r:embed="rId2">
-            <a:extLst>
-              <a:ext uri="{28A0092B-C50C-407E-A947-70E740481C1C}">
-                <a14:useLocalDpi xmlns:a14="http://schemas.microsoft.com/office/drawing/2010/main" val="0"/>
-              </a:ext>
-            </a:extLst>
-          </a:blip>
-          <a:stretch>
-            <a:fillRect/>
-          </a:stretch>
-        </p:blipFill>
-        <p:spPr>
-          <a:xfrm>
-            <a:off x="6735700" y="989237"/>
-            <a:ext cx="4970914" cy="869298"/>
-          </a:xfrm>
-          <a:prstGeom prst="rect">
-            <a:avLst/>
-          </a:prstGeom>
-        </p:spPr>
-      </p:pic>
     </p:spTree>
     <p:extLst>
       <p:ext uri="{BB962C8B-B14F-4D97-AF65-F5344CB8AC3E}">
@@ -6658,7 +6945,7 @@
         <p:spPr>
           <a:xfrm>
             <a:off x="32253" y="-201404"/>
-            <a:ext cx="10515600" cy="1325563"/>
+            <a:ext cx="12946328" cy="1325563"/>
           </a:xfrm>
         </p:spPr>
         <p:txBody>
@@ -6666,10 +6953,17 @@
           <a:lstStyle/>
           <a:p>
             <a:r>
+              <a:rPr lang="en-US" altLang="ja-JP" dirty="0"/>
+              <a:t>STEP1. m</a:t>
+            </a:r>
+            <a:r>
               <a:rPr kumimoji="1" lang="en-US" altLang="ja-JP" dirty="0"/>
-              <a:t>Button1.</a:t>
-            </a:r>
-            <a:endParaRPr kumimoji="1" lang="ja-JP" altLang="en-US" dirty="0"/>
+              <a:t>akemesh.py </a:t>
+            </a:r>
+            <a:r>
+              <a:rPr kumimoji="1" lang="ja-JP" altLang="en-US" dirty="0"/>
+              <a:t>を実行</a:t>
+            </a:r>
           </a:p>
         </p:txBody>
       </p:sp>
@@ -6691,7 +6985,7 @@
         </p:nvSpPr>
         <p:spPr>
           <a:xfrm>
-            <a:off x="0" y="771549"/>
+            <a:off x="143163" y="1124159"/>
             <a:ext cx="11905673" cy="5103019"/>
           </a:xfrm>
         </p:spPr>
@@ -6705,7 +6999,7 @@
             </a:r>
             <a:r>
               <a:rPr kumimoji="1" lang="en-US" altLang="ja-JP" u="sng" dirty="0"/>
-              <a:t>(*.stl)</a:t>
+              <a:t>(WALL.stl)</a:t>
             </a:r>
             <a:r>
               <a:rPr kumimoji="1" lang="ja-JP" altLang="en-US" u="sng" dirty="0"/>
@@ -6737,43 +7031,7 @@
               <a:rPr lang="ja-JP" altLang="en-US" u="sng" dirty="0"/>
               <a:t>を出力する。</a:t>
             </a:r>
-            <a:endParaRPr lang="en-US" altLang="ja-JP" dirty="0"/>
-          </a:p>
-          <a:p>
-            <a:pPr marL="0" indent="0">
-              <a:buNone/>
-            </a:pPr>
-            <a:r>
-              <a:rPr lang="ja-JP" altLang="en-US" dirty="0"/>
-              <a:t>　事前に、</a:t>
-            </a:r>
-            <a:endParaRPr lang="en-US" altLang="ja-JP" dirty="0"/>
-          </a:p>
-          <a:p>
-            <a:pPr marL="0" indent="0">
-              <a:buNone/>
-            </a:pPr>
-            <a:r>
-              <a:rPr lang="ja-JP" altLang="en-US" dirty="0"/>
-              <a:t>　「</a:t>
-            </a:r>
-            <a:r>
-              <a:rPr lang="en-US" altLang="ja-JP" dirty="0"/>
-              <a:t>input</a:t>
-            </a:r>
-            <a:r>
-              <a:rPr lang="ja-JP" altLang="en-US" dirty="0"/>
-              <a:t>」フォルダに入力データを「</a:t>
-            </a:r>
-            <a:r>
-              <a:rPr lang="en-US" altLang="ja-JP" dirty="0" err="1"/>
-              <a:t>WALL.stl</a:t>
-            </a:r>
-            <a:r>
-              <a:rPr lang="ja-JP" altLang="en-US" dirty="0"/>
-              <a:t>」という名前で用意してください。</a:t>
-            </a:r>
-            <a:endParaRPr lang="en-US" altLang="ja-JP" dirty="0"/>
+            <a:endParaRPr lang="en-US" altLang="ja-JP" u="sng" dirty="0"/>
           </a:p>
           <a:p>
             <a:pPr marL="0" indent="0">
@@ -6785,7 +7043,15 @@
             </a:r>
             <a:r>
               <a:rPr lang="en-US" altLang="ja-JP" dirty="0"/>
-              <a:t>(ASCII</a:t>
+              <a:t>(WALL.stl</a:t>
+            </a:r>
+            <a:r>
+              <a:rPr lang="ja-JP" altLang="en-US" dirty="0"/>
+              <a:t>は</a:t>
+            </a:r>
+            <a:r>
+              <a:rPr lang="en-US" altLang="ja-JP" dirty="0"/>
+              <a:t>ASCII</a:t>
             </a:r>
             <a:r>
               <a:rPr lang="ja-JP" altLang="en-US" dirty="0"/>
@@ -6835,7 +7101,7 @@
           <a:p>
             <a:fld id="{264A83B4-51C5-429F-97AA-BD916A4E8DDA}" type="datetime1">
               <a:rPr kumimoji="1" lang="ja-JP" altLang="en-US" smtClean="0"/>
-              <a:t>2024/12/13</a:t>
+              <a:t>2025/1/20</a:t>
             </a:fld>
             <a:endParaRPr kumimoji="1" lang="ja-JP" altLang="en-US"/>
           </a:p>
@@ -6898,7 +7164,7 @@
         </p:blipFill>
         <p:spPr>
           <a:xfrm>
-            <a:off x="692717" y="3183249"/>
+            <a:off x="809009" y="2984408"/>
             <a:ext cx="4414080" cy="3355231"/>
           </a:xfrm>
           <a:prstGeom prst="rect">
@@ -6934,7 +7200,7 @@
         </p:blipFill>
         <p:spPr>
           <a:xfrm>
-            <a:off x="6929292" y="3323058"/>
+            <a:off x="7045584" y="3124217"/>
             <a:ext cx="4663268" cy="3075615"/>
           </a:xfrm>
           <a:prstGeom prst="rect">
@@ -6956,7 +7222,7 @@
         </p:nvSpPr>
         <p:spPr>
           <a:xfrm>
-            <a:off x="5668356" y="4545904"/>
+            <a:off x="5784648" y="4347063"/>
             <a:ext cx="568960" cy="314960"/>
           </a:xfrm>
           <a:prstGeom prst="rightArrow">
@@ -7041,7 +7307,31 @@
           <a:p>
             <a:r>
               <a:rPr kumimoji="1" lang="en-US" altLang="ja-JP" dirty="0"/>
-              <a:t>Button2.</a:t>
+              <a:t>STEP2.  Button2 (</a:t>
+            </a:r>
+            <a:r>
+              <a:rPr kumimoji="1" lang="ja-JP" altLang="en-US" dirty="0"/>
+              <a:t>以降</a:t>
+            </a:r>
+            <a:r>
+              <a:rPr kumimoji="1" lang="en-US" altLang="ja-JP" dirty="0"/>
+              <a:t>, </a:t>
+            </a:r>
+            <a:r>
+              <a:rPr kumimoji="1" lang="en-US" altLang="ja-JP" dirty="0" err="1"/>
+              <a:t>c#</a:t>
+            </a:r>
+            <a:r>
+              <a:rPr kumimoji="1" lang="en-US" altLang="ja-JP" dirty="0"/>
+              <a:t> </a:t>
+            </a:r>
+            <a:r>
+              <a:rPr kumimoji="1" lang="ja-JP" altLang="en-US" dirty="0"/>
+              <a:t>コードの方</a:t>
+            </a:r>
+            <a:r>
+              <a:rPr kumimoji="1" lang="en-US" altLang="ja-JP" dirty="0"/>
+              <a:t>)</a:t>
             </a:r>
             <a:endParaRPr kumimoji="1" lang="ja-JP" altLang="en-US" dirty="0"/>
           </a:p>
@@ -7063,62 +7353,41 @@
             <p:ph idx="1"/>
           </p:nvPr>
         </p:nvSpPr>
-        <p:spPr/>
+        <p:spPr>
+          <a:xfrm>
+            <a:off x="42551" y="877489"/>
+            <a:ext cx="11905673" cy="5103019"/>
+          </a:xfrm>
+        </p:spPr>
         <p:txBody>
           <a:bodyPr/>
           <a:lstStyle/>
           <a:p>
             <a:r>
-              <a:rPr lang="en-US" altLang="ja-JP" u="sng" dirty="0"/>
+              <a:rPr lang="en-US" altLang="ja-JP" dirty="0"/>
               <a:t>Gmsh</a:t>
             </a:r>
             <a:r>
-              <a:rPr lang="ja-JP" altLang="en-US" u="sng" dirty="0"/>
+              <a:rPr lang="ja-JP" altLang="en-US" dirty="0"/>
               <a:t>で作成した</a:t>
             </a:r>
             <a:r>
-              <a:rPr lang="en-US" altLang="ja-JP" u="sng" dirty="0"/>
-              <a:t>(*.msh)</a:t>
-            </a:r>
-            <a:r>
-              <a:rPr lang="ja-JP" altLang="en-US" u="sng" dirty="0"/>
-              <a:t>ファイルを入力し、表面形状</a:t>
-            </a:r>
-            <a:r>
-              <a:rPr lang="en-US" altLang="ja-JP" u="sng" dirty="0"/>
-              <a:t>(*.stl)</a:t>
-            </a:r>
-            <a:r>
-              <a:rPr lang="ja-JP" altLang="en-US" u="sng" dirty="0"/>
-              <a:t>データを出力する</a:t>
-            </a:r>
-            <a:endParaRPr lang="en-US" altLang="ja-JP" u="sng" dirty="0"/>
-          </a:p>
-          <a:p>
+              <a:rPr lang="en-US" altLang="ja-JP" dirty="0"/>
+              <a:t>MeshOriginal.msh</a:t>
+            </a:r>
+            <a:r>
+              <a:rPr lang="ja-JP" altLang="en-US" dirty="0"/>
+              <a:t>を入力とし、表面形状</a:t>
+            </a:r>
+            <a:r>
+              <a:rPr lang="en-US" altLang="ja-JP" dirty="0"/>
+              <a:t>(gmsh22.stl)</a:t>
+            </a:r>
+            <a:r>
+              <a:rPr lang="ja-JP" altLang="en-US" dirty="0"/>
+              <a:t>を出力</a:t>
+            </a:r>
             <a:endParaRPr kumimoji="1" lang="en-US" altLang="ja-JP" u="sng" dirty="0"/>
-          </a:p>
-          <a:p>
-            <a:r>
-              <a:rPr lang="ja-JP" altLang="en-US" dirty="0"/>
-              <a:t>出力される</a:t>
-            </a:r>
-            <a:r>
-              <a:rPr lang="en-US" altLang="ja-JP" dirty="0"/>
-              <a:t>(*.stl)</a:t>
-            </a:r>
-            <a:r>
-              <a:rPr lang="ja-JP" altLang="en-US" dirty="0"/>
-              <a:t>は、</a:t>
-            </a:r>
-            <a:r>
-              <a:rPr lang="en-US" altLang="ja-JP" dirty="0"/>
-              <a:t>ASCII</a:t>
-            </a:r>
-            <a:r>
-              <a:rPr lang="ja-JP" altLang="en-US" dirty="0"/>
-              <a:t>形式。</a:t>
-            </a:r>
-            <a:endParaRPr kumimoji="1" lang="ja-JP" altLang="en-US" dirty="0"/>
           </a:p>
         </p:txBody>
       </p:sp>
@@ -7145,7 +7414,7 @@
           <a:p>
             <a:fld id="{264A83B4-51C5-429F-97AA-BD916A4E8DDA}" type="datetime1">
               <a:rPr kumimoji="1" lang="ja-JP" altLang="en-US" smtClean="0"/>
-              <a:t>2024/12/13</a:t>
+              <a:t>2025/1/20</a:t>
             </a:fld>
             <a:endParaRPr kumimoji="1" lang="ja-JP" altLang="en-US"/>
           </a:p>
@@ -7208,7 +7477,7 @@
         </p:blipFill>
         <p:spPr>
           <a:xfrm>
-            <a:off x="538541" y="2911076"/>
+            <a:off x="411566" y="1727579"/>
             <a:ext cx="4663268" cy="3075615"/>
           </a:xfrm>
           <a:prstGeom prst="rect">
@@ -7216,12 +7485,48 @@
           </a:prstGeom>
         </p:spPr>
       </p:pic>
-      <p:sp>
-        <p:nvSpPr>
-          <p:cNvPr id="7" name="矢印: 右 6">
-            <a:extLst>
-              <a:ext uri="{FF2B5EF4-FFF2-40B4-BE49-F238E27FC236}">
-                <a16:creationId xmlns:a16="http://schemas.microsoft.com/office/drawing/2014/main" id="{AA2DA3AC-C9E6-D391-7207-20DF88A448B9}"/>
+      <p:pic>
+        <p:nvPicPr>
+          <p:cNvPr id="8" name="図 7" descr="アイコン&#10;&#10;自動的に生成された説明">
+            <a:extLst>
+              <a:ext uri="{FF2B5EF4-FFF2-40B4-BE49-F238E27FC236}">
+                <a16:creationId xmlns:a16="http://schemas.microsoft.com/office/drawing/2014/main" id="{5DE261DB-1A20-7BD6-37D7-28A7837F5457}"/>
+              </a:ext>
+            </a:extLst>
+          </p:cNvPr>
+          <p:cNvPicPr>
+            <a:picLocks noChangeAspect="1"/>
+          </p:cNvPicPr>
+          <p:nvPr/>
+        </p:nvPicPr>
+        <p:blipFill>
+          <a:blip r:embed="rId3">
+            <a:extLst>
+              <a:ext uri="{28A0092B-C50C-407E-A947-70E740481C1C}">
+                <a14:useLocalDpi xmlns:a14="http://schemas.microsoft.com/office/drawing/2010/main" val="0"/>
+              </a:ext>
+            </a:extLst>
+          </a:blip>
+          <a:stretch>
+            <a:fillRect/>
+          </a:stretch>
+        </p:blipFill>
+        <p:spPr>
+          <a:xfrm>
+            <a:off x="6772709" y="1715181"/>
+            <a:ext cx="4414080" cy="3355231"/>
+          </a:xfrm>
+          <a:prstGeom prst="rect">
+            <a:avLst/>
+          </a:prstGeom>
+        </p:spPr>
+      </p:pic>
+      <p:sp>
+        <p:nvSpPr>
+          <p:cNvPr id="10" name="矢印: 右 9">
+            <a:extLst>
+              <a:ext uri="{FF2B5EF4-FFF2-40B4-BE49-F238E27FC236}">
+                <a16:creationId xmlns:a16="http://schemas.microsoft.com/office/drawing/2014/main" id="{F12DB502-AB12-34FE-8E0F-9C1AB4E482B2}"/>
               </a:ext>
             </a:extLst>
           </p:cNvPr>
@@ -7230,7 +7535,7 @@
         </p:nvSpPr>
         <p:spPr>
           <a:xfrm>
-            <a:off x="5668356" y="4545904"/>
+            <a:off x="5839162" y="3107906"/>
             <a:ext cx="568960" cy="314960"/>
           </a:xfrm>
           <a:prstGeom prst="rightArrow">
@@ -7262,42 +7567,116 @@
           </a:p>
         </p:txBody>
       </p:sp>
-      <p:pic>
-        <p:nvPicPr>
-          <p:cNvPr id="9" name="図 8" descr="テキスト&#10;&#10;自動的に生成された説明">
-            <a:extLst>
-              <a:ext uri="{FF2B5EF4-FFF2-40B4-BE49-F238E27FC236}">
-                <a16:creationId xmlns:a16="http://schemas.microsoft.com/office/drawing/2014/main" id="{77C91B79-B5C8-59DE-F04F-2B83E0D680B2}"/>
-              </a:ext>
-            </a:extLst>
-          </p:cNvPr>
-          <p:cNvPicPr>
-            <a:picLocks noChangeAspect="1"/>
-          </p:cNvPicPr>
+      <p:sp>
+        <p:nvSpPr>
+          <p:cNvPr id="11" name="テキスト ボックス 10">
+            <a:extLst>
+              <a:ext uri="{FF2B5EF4-FFF2-40B4-BE49-F238E27FC236}">
+                <a16:creationId xmlns:a16="http://schemas.microsoft.com/office/drawing/2014/main" id="{82C465F3-2BDC-7699-7554-0FCA7B96407C}"/>
+              </a:ext>
+            </a:extLst>
+          </p:cNvPr>
+          <p:cNvSpPr txBox="1"/>
           <p:nvPr/>
-        </p:nvPicPr>
-        <p:blipFill>
-          <a:blip r:embed="rId3">
-            <a:extLst>
-              <a:ext uri="{28A0092B-C50C-407E-A947-70E740481C1C}">
-                <a14:useLocalDpi xmlns:a14="http://schemas.microsoft.com/office/drawing/2010/main" val="0"/>
-              </a:ext>
-            </a:extLst>
-          </a:blip>
-          <a:stretch>
-            <a:fillRect/>
-          </a:stretch>
-        </p:blipFill>
+        </p:nvSpPr>
         <p:spPr>
           <a:xfrm>
-            <a:off x="6906403" y="2008280"/>
-            <a:ext cx="3680779" cy="4709568"/>
+            <a:off x="580103" y="5754641"/>
+            <a:ext cx="11611897" cy="923330"/>
           </a:xfrm>
           <a:prstGeom prst="rect">
             <a:avLst/>
           </a:prstGeom>
+          <a:noFill/>
         </p:spPr>
-      </p:pic>
+        <p:txBody>
+          <a:bodyPr wrap="none" rtlCol="0">
+            <a:spAutoFit/>
+          </a:bodyPr>
+          <a:lstStyle/>
+          <a:p>
+            <a:r>
+              <a:rPr kumimoji="1" lang="en-US" altLang="ja-JP" dirty="0"/>
+              <a:t>(※</a:t>
+            </a:r>
+            <a:r>
+              <a:rPr kumimoji="1" lang="ja-JP" altLang="en-US" dirty="0"/>
+              <a:t>ここで得られる</a:t>
+            </a:r>
+            <a:r>
+              <a:rPr kumimoji="1" lang="en-US" altLang="ja-JP" dirty="0"/>
+              <a:t>STL</a:t>
+            </a:r>
+            <a:r>
+              <a:rPr kumimoji="1" lang="ja-JP" altLang="en-US" dirty="0"/>
+              <a:t>データは、もともとの</a:t>
+            </a:r>
+            <a:r>
+              <a:rPr kumimoji="1" lang="en-US" altLang="ja-JP" dirty="0"/>
+              <a:t>WALL.stl</a:t>
+            </a:r>
+            <a:r>
+              <a:rPr kumimoji="1" lang="ja-JP" altLang="en-US" dirty="0"/>
+              <a:t>とは三角形パッチの粗さが異なります。もともとの</a:t>
+            </a:r>
+            <a:r>
+              <a:rPr kumimoji="1" lang="en-US" altLang="ja-JP" dirty="0"/>
+              <a:t>WALL.stl</a:t>
+            </a:r>
+            <a:r>
+              <a:rPr kumimoji="1" lang="ja-JP" altLang="en-US" dirty="0"/>
+              <a:t>は、</a:t>
+            </a:r>
+            <a:endParaRPr kumimoji="1" lang="en-US" altLang="ja-JP" dirty="0"/>
+          </a:p>
+          <a:p>
+            <a:r>
+              <a:rPr lang="ja-JP" altLang="en-US" dirty="0"/>
+              <a:t>　</a:t>
+            </a:r>
+            <a:r>
+              <a:rPr kumimoji="1" lang="ja-JP" altLang="en-US" dirty="0"/>
+              <a:t>形状情報のみが重要で、そこからどのようにメッシュを作成するかは</a:t>
+            </a:r>
+            <a:r>
+              <a:rPr kumimoji="1" lang="en-US" altLang="ja-JP" dirty="0"/>
+              <a:t>makemesh.py</a:t>
+            </a:r>
+            <a:r>
+              <a:rPr kumimoji="1" lang="ja-JP" altLang="en-US" dirty="0"/>
+              <a:t>内のパラメータによって決まります。</a:t>
+            </a:r>
+            <a:endParaRPr kumimoji="1" lang="en-US" altLang="ja-JP" dirty="0"/>
+          </a:p>
+          <a:p>
+            <a:r>
+              <a:rPr lang="ja-JP" altLang="en-US" dirty="0"/>
+              <a:t>　そして </a:t>
+            </a:r>
+            <a:r>
+              <a:rPr lang="en-US" altLang="ja-JP" dirty="0"/>
+              <a:t>makemesh.py</a:t>
+            </a:r>
+            <a:r>
+              <a:rPr lang="ja-JP" altLang="en-US" dirty="0"/>
+              <a:t>で作成されたメッシュモデルの、表面メッシュのみをそのまま抽出したのが</a:t>
+            </a:r>
+            <a:r>
+              <a:rPr lang="en-US" altLang="ja-JP" dirty="0"/>
+              <a:t>gmsh22.stl</a:t>
+            </a:r>
+            <a:r>
+              <a:rPr lang="ja-JP" altLang="en-US" dirty="0"/>
+              <a:t>です。</a:t>
+            </a:r>
+            <a:r>
+              <a:rPr kumimoji="1" lang="en-US" altLang="ja-JP" dirty="0"/>
+              <a:t>)</a:t>
+            </a:r>
+            <a:endParaRPr kumimoji="1" lang="ja-JP" altLang="en-US" dirty="0"/>
+          </a:p>
+        </p:txBody>
+      </p:sp>
     </p:spTree>
     <p:extLst>
       <p:ext uri="{BB962C8B-B14F-4D97-AF65-F5344CB8AC3E}">
@@ -7351,7 +7730,7 @@
           <a:p>
             <a:r>
               <a:rPr kumimoji="1" lang="en-US" altLang="ja-JP" dirty="0"/>
-              <a:t>Button3.</a:t>
+              <a:t>STEP3    Button3</a:t>
             </a:r>
             <a:endParaRPr kumimoji="1" lang="ja-JP" altLang="en-US" dirty="0"/>
           </a:p>
@@ -7406,26 +7785,8 @@
             </a:r>
             <a:r>
               <a:rPr lang="en-US" altLang="ja-JP" dirty="0"/>
-              <a:t>ASCII</a:t>
-            </a:r>
-            <a:r>
-              <a:rPr lang="ja-JP" altLang="en-US" dirty="0"/>
-              <a:t>形式の</a:t>
-            </a:r>
-            <a:r>
-              <a:rPr lang="en-US" altLang="ja-JP" dirty="0"/>
-              <a:t>(*.stl)</a:t>
-            </a:r>
-            <a:r>
-              <a:rPr lang="ja-JP" altLang="en-US" dirty="0"/>
-              <a:t>ファイル</a:t>
-            </a:r>
-            <a:endParaRPr lang="en-US" altLang="ja-JP" dirty="0"/>
-          </a:p>
-          <a:p>
-            <a:pPr marL="0" indent="0">
-              <a:buNone/>
-            </a:pPr>
+              <a:t>gmsh22.stl</a:t>
+            </a:r>
             <a:r>
               <a:rPr kumimoji="1" lang="ja-JP" altLang="en-US" dirty="0"/>
               <a:t>　の順に入力。</a:t>
@@ -7499,7 +7860,7 @@
           <a:p>
             <a:fld id="{264A83B4-51C5-429F-97AA-BD916A4E8DDA}" type="datetime1">
               <a:rPr kumimoji="1" lang="ja-JP" altLang="en-US" smtClean="0"/>
-              <a:t>2024/12/13</a:t>
+              <a:t>2025/1/20</a:t>
             </a:fld>
             <a:endParaRPr kumimoji="1" lang="ja-JP" altLang="en-US"/>
           </a:p>
@@ -7587,7 +7948,11 @@
           <a:p>
             <a:r>
               <a:rPr kumimoji="1" lang="en-US" altLang="ja-JP" dirty="0"/>
-              <a:t>Button4.</a:t>
+              <a:t>STEP4     Button4</a:t>
+            </a:r>
+            <a:r>
+              <a:rPr lang="en-US" altLang="ja-JP" dirty="0"/>
+              <a:t> </a:t>
             </a:r>
             <a:endParaRPr kumimoji="1" lang="ja-JP" altLang="en-US" dirty="0"/>
           </a:p>
@@ -7650,31 +8015,66 @@
               <a:t>→ </a:t>
             </a:r>
             <a:r>
+              <a:rPr kumimoji="1" lang="en-US" altLang="ja-JP" dirty="0" err="1"/>
+              <a:t>meshOriginal.msh</a:t>
+            </a:r>
+            <a:endParaRPr kumimoji="1" lang="en-US" altLang="ja-JP" dirty="0"/>
+          </a:p>
+          <a:p>
+            <a:pPr marL="0" indent="0">
+              <a:buNone/>
+            </a:pPr>
+            <a:r>
+              <a:rPr lang="ja-JP" altLang="en-US" dirty="0"/>
+              <a:t>　</a:t>
+            </a:r>
+            <a:r>
+              <a:rPr lang="en-US" altLang="ja-JP" dirty="0"/>
+              <a:t>(</a:t>
+            </a:r>
+            <a:r>
+              <a:rPr lang="ja-JP" altLang="en-US" dirty="0"/>
+              <a:t>もし「例外がスローされました」とでたら、実行を継続します</a:t>
+            </a:r>
+            <a:r>
+              <a:rPr lang="en-US" altLang="ja-JP" dirty="0"/>
+              <a:t> </a:t>
+            </a:r>
+            <a:r>
+              <a:rPr lang="ja-JP" altLang="en-US" dirty="0"/>
+              <a:t>という欄の</a:t>
+            </a:r>
+            <a:endParaRPr lang="en-US" altLang="ja-JP" dirty="0"/>
+          </a:p>
+          <a:p>
+            <a:pPr marL="0" indent="0">
+              <a:buNone/>
+            </a:pPr>
+            <a:r>
+              <a:rPr lang="ja-JP" altLang="en-US" dirty="0"/>
+              <a:t>　「続 行」をクリックしてください</a:t>
+            </a:r>
+            <a:r>
+              <a:rPr lang="en-US" altLang="ja-JP" dirty="0"/>
+              <a:t>)</a:t>
+            </a:r>
+            <a:endParaRPr kumimoji="1" lang="en-US" altLang="ja-JP" dirty="0"/>
+          </a:p>
+          <a:p>
+            <a:pPr marL="0" indent="0">
+              <a:buNone/>
+            </a:pPr>
+            <a:r>
+              <a:rPr lang="ja-JP" altLang="en-US" dirty="0"/>
+              <a:t>・再び入力を求められるので、</a:t>
+            </a:r>
+            <a:r>
+              <a:rPr kumimoji="1" lang="en-US" altLang="ja-JP" dirty="0" err="1"/>
+              <a:t>MeshInner.msh</a:t>
+            </a:r>
+            <a:r>
               <a:rPr kumimoji="1" lang="en-US" altLang="ja-JP" dirty="0"/>
-              <a:t>meshOriginal.msh</a:t>
-            </a:r>
-          </a:p>
-          <a:p>
-            <a:pPr marL="0" indent="0">
-              <a:buNone/>
-            </a:pPr>
-            <a:r>
-              <a:rPr lang="ja-JP" altLang="en-US" dirty="0"/>
-              <a:t>　入力。計算ののち、再び入力を求められるので、</a:t>
-            </a:r>
-            <a:endParaRPr lang="en-US" altLang="ja-JP" dirty="0"/>
-          </a:p>
-          <a:p>
-            <a:pPr marL="0" indent="0">
-              <a:buNone/>
-            </a:pPr>
-            <a:r>
-              <a:rPr kumimoji="1" lang="ja-JP" altLang="en-US" dirty="0"/>
-              <a:t>　</a:t>
-            </a:r>
-            <a:r>
-              <a:rPr kumimoji="1" lang="en-US" altLang="ja-JP" dirty="0"/>
-              <a:t>MeshInner.msh </a:t>
+              <a:t> </a:t>
             </a:r>
             <a:r>
               <a:rPr kumimoji="1" lang="ja-JP" altLang="en-US" dirty="0"/>
@@ -7733,7 +8133,7 @@
           <a:p>
             <a:fld id="{264A83B4-51C5-429F-97AA-BD916A4E8DDA}" type="datetime1">
               <a:rPr kumimoji="1" lang="ja-JP" altLang="en-US" smtClean="0"/>
-              <a:t>2024/12/13</a:t>
+              <a:t>2025/1/20</a:t>
             </a:fld>
             <a:endParaRPr kumimoji="1" lang="ja-JP" altLang="en-US"/>
           </a:p>
@@ -7796,8 +8196,8 @@
         </p:blipFill>
         <p:spPr>
           <a:xfrm>
-            <a:off x="666114" y="3428999"/>
-            <a:ext cx="4663268" cy="3075615"/>
+            <a:off x="1126206" y="3938872"/>
+            <a:ext cx="4239062" cy="2795834"/>
           </a:xfrm>
           <a:prstGeom prst="rect">
             <a:avLst/>
@@ -7832,8 +8232,8 @@
         </p:blipFill>
         <p:spPr>
           <a:xfrm>
-            <a:off x="6547742" y="3524048"/>
-            <a:ext cx="5542368" cy="2885516"/>
+            <a:off x="6491474" y="3960759"/>
+            <a:ext cx="5414199" cy="2818788"/>
           </a:xfrm>
           <a:prstGeom prst="rect">
             <a:avLst/>
@@ -7854,7 +8254,7 @@
         </p:nvSpPr>
         <p:spPr>
           <a:xfrm>
-            <a:off x="5647174" y="4893547"/>
+            <a:off x="5677482" y="5206161"/>
             <a:ext cx="602901" cy="261257"/>
           </a:xfrm>
           <a:prstGeom prst="rightArrow">
@@ -7921,7 +8321,7 @@
           <p:cNvPr id="2" name="タイトル 1">
             <a:extLst>
               <a:ext uri="{FF2B5EF4-FFF2-40B4-BE49-F238E27FC236}">
-                <a16:creationId xmlns:a16="http://schemas.microsoft.com/office/drawing/2014/main" id="{E7BF4277-6164-378A-D8B2-744E72721D96}"/>
+                <a16:creationId xmlns:a16="http://schemas.microsoft.com/office/drawing/2014/main" id="{57E83F19-56BA-9A6B-DA1C-8690DEE8D809}"/>
               </a:ext>
             </a:extLst>
           </p:cNvPr>
@@ -7938,8 +8338,16 @@
           <a:lstStyle/>
           <a:p>
             <a:r>
+              <a:rPr kumimoji="1" lang="en-US" altLang="ja-JP" dirty="0"/>
+              <a:t>STEP5.   </a:t>
+            </a:r>
+            <a:r>
+              <a:rPr lang="ja-JP" altLang="en-US" dirty="0"/>
+              <a:t>結果</a:t>
+            </a:r>
+            <a:r>
               <a:rPr kumimoji="1" lang="ja-JP" altLang="en-US" dirty="0"/>
-              <a:t>ファイル入出力のイメージ</a:t>
+              <a:t>を確認する</a:t>
             </a:r>
           </a:p>
         </p:txBody>
@@ -7949,7 +8357,7 @@
           <p:cNvPr id="3" name="コンテンツ プレースホルダー 2">
             <a:extLst>
               <a:ext uri="{FF2B5EF4-FFF2-40B4-BE49-F238E27FC236}">
-                <a16:creationId xmlns:a16="http://schemas.microsoft.com/office/drawing/2014/main" id="{6E5502D5-98A4-D4BB-AF7A-106E11426757}"/>
+                <a16:creationId xmlns:a16="http://schemas.microsoft.com/office/drawing/2014/main" id="{A3C72365-E9E0-297C-24A5-495F25CB5B91}"/>
               </a:ext>
             </a:extLst>
           </p:cNvPr>
@@ -7966,96 +8374,98 @@
           <a:lstStyle/>
           <a:p>
             <a:r>
+              <a:rPr kumimoji="1" lang="en-US" altLang="ja-JP" dirty="0" err="1"/>
+              <a:t>Gmsh</a:t>
+            </a:r>
+            <a:r>
+              <a:rPr kumimoji="1" lang="en-US" altLang="ja-JP" dirty="0"/>
+              <a:t> </a:t>
+            </a:r>
+            <a:r>
               <a:rPr kumimoji="1" lang="ja-JP" altLang="en-US" dirty="0"/>
-              <a:t>入力</a:t>
-            </a:r>
-            <a:endParaRPr kumimoji="1" lang="en-US" altLang="ja-JP" dirty="0"/>
-          </a:p>
-          <a:p>
-            <a:pPr marL="0" indent="0">
-              <a:buNone/>
-            </a:pPr>
-            <a:r>
-              <a:rPr kumimoji="1" lang="ja-JP" altLang="en-US" dirty="0"/>
-              <a:t>　基準中心線点群</a:t>
-            </a:r>
-            <a:r>
-              <a:rPr kumimoji="1" lang="en-US" altLang="ja-JP" dirty="0"/>
-              <a:t>(*.txt), </a:t>
-            </a:r>
-            <a:r>
-              <a:rPr kumimoji="1" lang="ja-JP" altLang="en-US" dirty="0"/>
-              <a:t>基準表面形状</a:t>
-            </a:r>
-            <a:r>
-              <a:rPr kumimoji="1" lang="en-US" altLang="ja-JP" dirty="0"/>
-              <a:t>(*.stl) (ASCII</a:t>
-            </a:r>
-            <a:r>
-              <a:rPr kumimoji="1" lang="ja-JP" altLang="en-US" dirty="0"/>
-              <a:t>形式</a:t>
-            </a:r>
-            <a:r>
-              <a:rPr kumimoji="1" lang="en-US" altLang="ja-JP" dirty="0"/>
-              <a:t>)</a:t>
-            </a:r>
-          </a:p>
-          <a:p>
-            <a:pPr marL="0" indent="0">
-              <a:buNone/>
-            </a:pPr>
+              <a:t>をインストールし、パスを通していれば、ターミナルから </a:t>
+            </a:r>
             <a:r>
               <a:rPr lang="ja-JP" altLang="en-US" dirty="0"/>
-              <a:t>　目標中心線点群</a:t>
+              <a:t>「</a:t>
+            </a:r>
+            <a:r>
+              <a:rPr lang="en-US" altLang="ja-JP" dirty="0" err="1"/>
+              <a:t>gmsh</a:t>
+            </a:r>
+            <a:r>
+              <a:rPr lang="ja-JP" altLang="en-US" dirty="0"/>
+              <a:t>」 と打つことで</a:t>
+            </a:r>
+            <a:r>
+              <a:rPr lang="en-US" altLang="ja-JP" dirty="0" err="1"/>
+              <a:t>Gmsh</a:t>
             </a:r>
             <a:r>
               <a:rPr lang="en-US" altLang="ja-JP" dirty="0"/>
-              <a:t>(*.txt) (</a:t>
+              <a:t> </a:t>
             </a:r>
             <a:r>
               <a:rPr lang="ja-JP" altLang="en-US" dirty="0"/>
-              <a:t>←これは自身で作成してもよい</a:t>
+              <a:t>の</a:t>
+            </a:r>
+            <a:r>
+              <a:rPr lang="en-US" altLang="ja-JP" dirty="0"/>
+              <a:t>GUI</a:t>
+            </a:r>
+            <a:r>
+              <a:rPr lang="ja-JP" altLang="en-US" dirty="0"/>
+              <a:t>画面が立ち上がるので、「</a:t>
+            </a:r>
+            <a:r>
+              <a:rPr lang="en-US" altLang="ja-JP" dirty="0"/>
+              <a:t>file</a:t>
+            </a:r>
+            <a:r>
+              <a:rPr lang="ja-JP" altLang="en-US" dirty="0"/>
+              <a:t>」→「</a:t>
+            </a:r>
+            <a:r>
+              <a:rPr lang="en-US" altLang="ja-JP" dirty="0"/>
+              <a:t>open</a:t>
+            </a:r>
+            <a:r>
+              <a:rPr lang="ja-JP" altLang="en-US" dirty="0"/>
+              <a:t>」から生成したファイル</a:t>
+            </a:r>
+            <a:r>
+              <a:rPr lang="en-US" altLang="ja-JP" dirty="0"/>
+              <a:t>(</a:t>
+            </a:r>
+            <a:r>
+              <a:rPr lang="en-US" altLang="ja-JP" dirty="0" err="1"/>
+              <a:t>MeshMerged.msh</a:t>
             </a:r>
             <a:r>
               <a:rPr lang="en-US" altLang="ja-JP" dirty="0"/>
               <a:t>)</a:t>
             </a:r>
-          </a:p>
-          <a:p>
-            <a:pPr marL="0" indent="0">
-              <a:buNone/>
-            </a:pPr>
+            <a:r>
+              <a:rPr lang="ja-JP" altLang="en-US" dirty="0"/>
+              <a:t>を選択し、変形後の形状やメッシュ精度を確認してください。</a:t>
+            </a:r>
+            <a:endParaRPr lang="en-US" altLang="ja-JP" dirty="0"/>
+          </a:p>
+          <a:p>
             <a:endParaRPr kumimoji="1" lang="en-US" altLang="ja-JP" dirty="0"/>
           </a:p>
           <a:p>
-            <a:pPr marL="0" indent="0">
-              <a:buNone/>
-            </a:pPr>
             <a:r>
               <a:rPr lang="ja-JP" altLang="en-US" dirty="0"/>
-              <a:t>・最終的な出力</a:t>
-            </a:r>
-            <a:endParaRPr lang="en-US" altLang="ja-JP" dirty="0"/>
-          </a:p>
-          <a:p>
-            <a:pPr marL="0" indent="0">
-              <a:buNone/>
-            </a:pPr>
-            <a:r>
-              <a:rPr lang="ja-JP" altLang="en-US" dirty="0"/>
-              <a:t>　変形後の解析モデル</a:t>
+              <a:t>あるいは、</a:t>
+            </a:r>
+            <a:r>
+              <a:rPr lang="en-US" altLang="ja-JP" dirty="0" err="1"/>
+              <a:t>vtk</a:t>
             </a:r>
             <a:r>
               <a:rPr lang="en-US" altLang="ja-JP" dirty="0"/>
-              <a:t>(Gmsh</a:t>
-            </a:r>
-            <a:r>
-              <a:rPr lang="ja-JP" altLang="en-US" dirty="0"/>
-              <a:t>形式の</a:t>
-            </a:r>
-            <a:r>
-              <a:rPr lang="en-US" altLang="ja-JP" dirty="0"/>
-              <a:t>msh</a:t>
+              <a:t> </a:t>
             </a:r>
             <a:r>
               <a:rPr lang="ja-JP" altLang="en-US" dirty="0"/>
@@ -8063,14 +8473,40 @@
             </a:r>
             <a:r>
               <a:rPr lang="en-US" altLang="ja-JP" dirty="0"/>
-              <a:t>)</a:t>
+              <a:t>(</a:t>
+            </a:r>
+            <a:r>
+              <a:rPr lang="en-US" altLang="ja-JP" dirty="0" err="1"/>
+              <a:t>MeshMerged.vtk</a:t>
+            </a:r>
+            <a:r>
+              <a:rPr lang="en-US" altLang="ja-JP" dirty="0"/>
+              <a:t>) </a:t>
             </a:r>
             <a:r>
               <a:rPr lang="ja-JP" altLang="en-US" dirty="0"/>
-              <a:t> </a:t>
+              <a:t>も出力されているので、</a:t>
             </a:r>
             <a:endParaRPr lang="en-US" altLang="ja-JP" dirty="0"/>
           </a:p>
+          <a:p>
+            <a:pPr marL="0" indent="0">
+              <a:buNone/>
+            </a:pPr>
+            <a:r>
+              <a:rPr lang="ja-JP" altLang="en-US" dirty="0"/>
+              <a:t>　</a:t>
+            </a:r>
+            <a:r>
+              <a:rPr lang="en-US" altLang="ja-JP" dirty="0" err="1"/>
+              <a:t>paraview</a:t>
+            </a:r>
+            <a:r>
+              <a:rPr lang="ja-JP" altLang="en-US" dirty="0"/>
+              <a:t>で可視化して下さい。</a:t>
+            </a:r>
+            <a:endParaRPr kumimoji="1" lang="ja-JP" altLang="en-US" dirty="0"/>
+          </a:p>
         </p:txBody>
       </p:sp>
       <p:sp>
@@ -8078,7 +8514,7 @@
           <p:cNvPr id="4" name="日付プレースホルダー 3">
             <a:extLst>
               <a:ext uri="{FF2B5EF4-FFF2-40B4-BE49-F238E27FC236}">
-                <a16:creationId xmlns:a16="http://schemas.microsoft.com/office/drawing/2014/main" id="{160340A2-7600-FA24-2AC1-2EE41B8521CF}"/>
+                <a16:creationId xmlns:a16="http://schemas.microsoft.com/office/drawing/2014/main" id="{BDE41989-7BB8-6FCB-2950-0068D9DE7886}"/>
               </a:ext>
             </a:extLst>
           </p:cNvPr>
@@ -8096,7 +8532,7 @@
           <a:p>
             <a:fld id="{264A83B4-51C5-429F-97AA-BD916A4E8DDA}" type="datetime1">
               <a:rPr kumimoji="1" lang="ja-JP" altLang="en-US" smtClean="0"/>
-              <a:t>2024/12/13</a:t>
+              <a:t>2025/1/20</a:t>
             </a:fld>
             <a:endParaRPr kumimoji="1" lang="ja-JP" altLang="en-US"/>
           </a:p>
@@ -8107,7 +8543,7 @@
           <p:cNvPr id="5" name="スライド番号プレースホルダー 4">
             <a:extLst>
               <a:ext uri="{FF2B5EF4-FFF2-40B4-BE49-F238E27FC236}">
-                <a16:creationId xmlns:a16="http://schemas.microsoft.com/office/drawing/2014/main" id="{38751C46-0497-3A6E-FE39-37AE2EC975A4}"/>
+                <a16:creationId xmlns:a16="http://schemas.microsoft.com/office/drawing/2014/main" id="{8E94893C-61A8-1564-55C1-D1DC385819A2}"/>
               </a:ext>
             </a:extLst>
           </p:cNvPr>
@@ -8134,7 +8570,7 @@
     </p:spTree>
     <p:extLst>
       <p:ext uri="{BB962C8B-B14F-4D97-AF65-F5344CB8AC3E}">
-        <p14:creationId xmlns:p14="http://schemas.microsoft.com/office/powerpoint/2010/main" val="3690635319"/>
+        <p14:creationId xmlns:p14="http://schemas.microsoft.com/office/powerpoint/2010/main" val="2871196163"/>
       </p:ext>
     </p:extLst>
   </p:cSld>

</xml_diff>